<commit_message>
added logs and config py
</commit_message>
<xml_diff>
--- a/documentation/Design_Layout.pptx
+++ b/documentation/Design_Layout.pptx
@@ -18,6 +18,7 @@
     <p:sldId id="269" r:id="rId12"/>
     <p:sldId id="271" r:id="rId13"/>
     <p:sldId id="270" r:id="rId14"/>
+    <p:sldId id="272" r:id="rId15"/>
   </p:sldIdLst>
   <p:sldSz cx="12192000" cy="6858000"/>
   <p:notesSz cx="6858000" cy="9144000"/>
@@ -146,9 +147,13 @@
             <p14:sldId id="269"/>
             <p14:sldId id="271"/>
             <p14:sldId id="270"/>
+            <p14:sldId id="272"/>
           </p14:sldIdLst>
         </p14:section>
       </p14:sectionLst>
+    </p:ext>
+    <p:ext uri="{EFAFB233-063F-42B5-8137-9DF3F51BA10A}">
+      <p15:sldGuideLst xmlns:p15="http://schemas.microsoft.com/office/powerpoint/2012/main"/>
     </p:ext>
   </p:extLst>
 </p:presentation>
@@ -303,7 +308,7 @@
           <a:p>
             <a:fld id="{7AEBDB11-EC6D-464D-A872-6B5FEC42C556}" type="datetimeFigureOut">
               <a:rPr lang="en-IE" smtClean="0"/>
-              <a:t>27/09/2024</a:t>
+              <a:t>07/10/2024</a:t>
             </a:fld>
             <a:endParaRPr lang="en-IE"/>
           </a:p>
@@ -503,7 +508,7 @@
           <a:p>
             <a:fld id="{7AEBDB11-EC6D-464D-A872-6B5FEC42C556}" type="datetimeFigureOut">
               <a:rPr lang="en-IE" smtClean="0"/>
-              <a:t>27/09/2024</a:t>
+              <a:t>07/10/2024</a:t>
             </a:fld>
             <a:endParaRPr lang="en-IE"/>
           </a:p>
@@ -713,7 +718,7 @@
           <a:p>
             <a:fld id="{7AEBDB11-EC6D-464D-A872-6B5FEC42C556}" type="datetimeFigureOut">
               <a:rPr lang="en-IE" smtClean="0"/>
-              <a:t>27/09/2024</a:t>
+              <a:t>07/10/2024</a:t>
             </a:fld>
             <a:endParaRPr lang="en-IE"/>
           </a:p>
@@ -913,7 +918,7 @@
           <a:p>
             <a:fld id="{7AEBDB11-EC6D-464D-A872-6B5FEC42C556}" type="datetimeFigureOut">
               <a:rPr lang="en-IE" smtClean="0"/>
-              <a:t>27/09/2024</a:t>
+              <a:t>07/10/2024</a:t>
             </a:fld>
             <a:endParaRPr lang="en-IE"/>
           </a:p>
@@ -1189,7 +1194,7 @@
           <a:p>
             <a:fld id="{7AEBDB11-EC6D-464D-A872-6B5FEC42C556}" type="datetimeFigureOut">
               <a:rPr lang="en-IE" smtClean="0"/>
-              <a:t>27/09/2024</a:t>
+              <a:t>07/10/2024</a:t>
             </a:fld>
             <a:endParaRPr lang="en-IE"/>
           </a:p>
@@ -1457,7 +1462,7 @@
           <a:p>
             <a:fld id="{7AEBDB11-EC6D-464D-A872-6B5FEC42C556}" type="datetimeFigureOut">
               <a:rPr lang="en-IE" smtClean="0"/>
-              <a:t>27/09/2024</a:t>
+              <a:t>07/10/2024</a:t>
             </a:fld>
             <a:endParaRPr lang="en-IE"/>
           </a:p>
@@ -1872,7 +1877,7 @@
           <a:p>
             <a:fld id="{7AEBDB11-EC6D-464D-A872-6B5FEC42C556}" type="datetimeFigureOut">
               <a:rPr lang="en-IE" smtClean="0"/>
-              <a:t>27/09/2024</a:t>
+              <a:t>07/10/2024</a:t>
             </a:fld>
             <a:endParaRPr lang="en-IE"/>
           </a:p>
@@ -2014,7 +2019,7 @@
           <a:p>
             <a:fld id="{7AEBDB11-EC6D-464D-A872-6B5FEC42C556}" type="datetimeFigureOut">
               <a:rPr lang="en-IE" smtClean="0"/>
-              <a:t>27/09/2024</a:t>
+              <a:t>07/10/2024</a:t>
             </a:fld>
             <a:endParaRPr lang="en-IE"/>
           </a:p>
@@ -2127,7 +2132,7 @@
           <a:p>
             <a:fld id="{7AEBDB11-EC6D-464D-A872-6B5FEC42C556}" type="datetimeFigureOut">
               <a:rPr lang="en-IE" smtClean="0"/>
-              <a:t>27/09/2024</a:t>
+              <a:t>07/10/2024</a:t>
             </a:fld>
             <a:endParaRPr lang="en-IE"/>
           </a:p>
@@ -2440,7 +2445,7 @@
           <a:p>
             <a:fld id="{7AEBDB11-EC6D-464D-A872-6B5FEC42C556}" type="datetimeFigureOut">
               <a:rPr lang="en-IE" smtClean="0"/>
-              <a:t>27/09/2024</a:t>
+              <a:t>07/10/2024</a:t>
             </a:fld>
             <a:endParaRPr lang="en-IE"/>
           </a:p>
@@ -2729,7 +2734,7 @@
           <a:p>
             <a:fld id="{7AEBDB11-EC6D-464D-A872-6B5FEC42C556}" type="datetimeFigureOut">
               <a:rPr lang="en-IE" smtClean="0"/>
-              <a:t>27/09/2024</a:t>
+              <a:t>07/10/2024</a:t>
             </a:fld>
             <a:endParaRPr lang="en-IE"/>
           </a:p>
@@ -2972,7 +2977,7 @@
           <a:p>
             <a:fld id="{7AEBDB11-EC6D-464D-A872-6B5FEC42C556}" type="datetimeFigureOut">
               <a:rPr lang="en-IE" smtClean="0"/>
-              <a:t>27/09/2024</a:t>
+              <a:t>07/10/2024</a:t>
             </a:fld>
             <a:endParaRPr lang="en-IE"/>
           </a:p>
@@ -6943,6 +6948,95 @@
     <p:extLst>
       <p:ext uri="{BB962C8B-B14F-4D97-AF65-F5344CB8AC3E}">
         <p14:creationId xmlns:p14="http://schemas.microsoft.com/office/powerpoint/2010/main" val="3594331731"/>
+      </p:ext>
+    </p:extLst>
+  </p:cSld>
+  <p:clrMapOvr>
+    <a:masterClrMapping/>
+  </p:clrMapOvr>
+</p:sld>
+</file>
+
+<file path=ppt/slides/slide14.xml><?xml version="1.0" encoding="utf-8"?>
+<p:sld xmlns:a="http://schemas.openxmlformats.org/drawingml/2006/main" xmlns:r="http://schemas.openxmlformats.org/officeDocument/2006/relationships" xmlns:p="http://schemas.openxmlformats.org/presentationml/2006/main">
+  <p:cSld>
+    <p:spTree>
+      <p:nvGrpSpPr>
+        <p:cNvPr id="1" name=""/>
+        <p:cNvGrpSpPr/>
+        <p:nvPr/>
+      </p:nvGrpSpPr>
+      <p:grpSpPr>
+        <a:xfrm>
+          <a:off x="0" y="0"/>
+          <a:ext cx="0" cy="0"/>
+          <a:chOff x="0" y="0"/>
+          <a:chExt cx="0" cy="0"/>
+        </a:xfrm>
+      </p:grpSpPr>
+      <p:sp>
+        <p:nvSpPr>
+          <p:cNvPr id="4" name="Rectangle 3">
+            <a:extLst>
+              <a:ext uri="{FF2B5EF4-FFF2-40B4-BE49-F238E27FC236}">
+                <a16:creationId xmlns:a16="http://schemas.microsoft.com/office/drawing/2014/main" id="{2A840549-A3BC-D625-E2E9-7D9A0FAEFFE9}"/>
+              </a:ext>
+            </a:extLst>
+          </p:cNvPr>
+          <p:cNvSpPr/>
+          <p:nvPr/>
+        </p:nvSpPr>
+        <p:spPr>
+          <a:xfrm>
+            <a:off x="310992" y="559515"/>
+            <a:ext cx="11570016" cy="5738970"/>
+          </a:xfrm>
+          <a:prstGeom prst="rect">
+            <a:avLst/>
+          </a:prstGeom>
+          <a:solidFill>
+            <a:srgbClr val="F6F7F8"/>
+          </a:solidFill>
+          <a:ln w="3175">
+            <a:solidFill>
+              <a:schemeClr val="bg1">
+                <a:lumMod val="75000"/>
+              </a:schemeClr>
+            </a:solidFill>
+          </a:ln>
+        </p:spPr>
+        <p:style>
+          <a:lnRef idx="2">
+            <a:schemeClr val="accent1">
+              <a:shade val="15000"/>
+            </a:schemeClr>
+          </a:lnRef>
+          <a:fillRef idx="1">
+            <a:schemeClr val="accent1"/>
+          </a:fillRef>
+          <a:effectRef idx="0">
+            <a:schemeClr val="accent1"/>
+          </a:effectRef>
+          <a:fontRef idx="minor">
+            <a:schemeClr val="lt1"/>
+          </a:fontRef>
+        </p:style>
+        <p:txBody>
+          <a:bodyPr rtlCol="0" anchor="ctr"/>
+          <a:lstStyle/>
+          <a:p>
+            <a:pPr algn="ctr"/>
+            <a:r>
+              <a:rPr lang="en-IE"/>
+              <a:t>#BBC0C6</a:t>
+            </a:r>
+          </a:p>
+        </p:txBody>
+      </p:sp>
+    </p:spTree>
+    <p:extLst>
+      <p:ext uri="{BB962C8B-B14F-4D97-AF65-F5344CB8AC3E}">
+        <p14:creationId xmlns:p14="http://schemas.microsoft.com/office/powerpoint/2010/main" val="686738355"/>
       </p:ext>
     </p:extLst>
   </p:cSld>

</xml_diff>